<commit_message>
Project's update Signed off by: Luca Inghilterra E-mail: 271539@studenti.unimore.it
</commit_message>
<xml_diff>
--- a/docs/Hakertz_RTES_Presentation.pptx
+++ b/docs/Hakertz_RTES_Presentation.pptx
@@ -1279,6 +1279,211 @@
     </pc:docChg>
   </pc:docChgLst>
   <pc:docChgLst>
+    <pc:chgData name="Utente guest" userId="S::urn:spo:anon#a2348d943f0b7a4d411fa761fd1ae9a36ef729135e117ae163cbf94b0bb3eff5::" providerId="AD" clId="Web-{47F70BF6-63C4-E085-4D92-61D5A5C06515}"/>
+    <pc:docChg chg="addSld delSld modSld">
+      <pc:chgData name="Utente guest" userId="S::urn:spo:anon#a2348d943f0b7a4d411fa761fd1ae9a36ef729135e117ae163cbf94b0bb3eff5::" providerId="AD" clId="Web-{47F70BF6-63C4-E085-4D92-61D5A5C06515}" dt="2023-07-24T23:22:47.566" v="92" actId="1076"/>
+      <pc:docMkLst>
+        <pc:docMk/>
+      </pc:docMkLst>
+      <pc:sldChg chg="addSp modSp">
+        <pc:chgData name="Utente guest" userId="S::urn:spo:anon#a2348d943f0b7a4d411fa761fd1ae9a36ef729135e117ae163cbf94b0bb3eff5::" providerId="AD" clId="Web-{47F70BF6-63C4-E085-4D92-61D5A5C06515}" dt="2023-07-24T23:22:47.566" v="92" actId="1076"/>
+        <pc:sldMkLst>
+          <pc:docMk/>
+          <pc:sldMk cId="3796201048" sldId="312"/>
+        </pc:sldMkLst>
+        <pc:picChg chg="add mod">
+          <ac:chgData name="Utente guest" userId="S::urn:spo:anon#a2348d943f0b7a4d411fa761fd1ae9a36ef729135e117ae163cbf94b0bb3eff5::" providerId="AD" clId="Web-{47F70BF6-63C4-E085-4D92-61D5A5C06515}" dt="2023-07-24T23:22:47.566" v="92" actId="1076"/>
+          <ac:picMkLst>
+            <pc:docMk/>
+            <pc:sldMk cId="3796201048" sldId="312"/>
+            <ac:picMk id="2" creationId="{B08C89C6-8626-4113-4280-0F34705EC2D2}"/>
+          </ac:picMkLst>
+        </pc:picChg>
+      </pc:sldChg>
+      <pc:sldChg chg="addSp delSp modSp">
+        <pc:chgData name="Utente guest" userId="S::urn:spo:anon#a2348d943f0b7a4d411fa761fd1ae9a36ef729135e117ae163cbf94b0bb3eff5::" providerId="AD" clId="Web-{47F70BF6-63C4-E085-4D92-61D5A5C06515}" dt="2023-07-24T22:06:40.831" v="85" actId="1076"/>
+        <pc:sldMkLst>
+          <pc:docMk/>
+          <pc:sldMk cId="1947503260" sldId="357"/>
+        </pc:sldMkLst>
+        <pc:picChg chg="add del mod">
+          <ac:chgData name="Utente guest" userId="S::urn:spo:anon#a2348d943f0b7a4d411fa761fd1ae9a36ef729135e117ae163cbf94b0bb3eff5::" providerId="AD" clId="Web-{47F70BF6-63C4-E085-4D92-61D5A5C06515}" dt="2023-07-24T21:37:44.781" v="13"/>
+          <ac:picMkLst>
+            <pc:docMk/>
+            <pc:sldMk cId="1947503260" sldId="357"/>
+            <ac:picMk id="2" creationId="{10A2A9D6-E539-4451-7829-3CBDF379483D}"/>
+          </ac:picMkLst>
+        </pc:picChg>
+        <pc:picChg chg="add mod">
+          <ac:chgData name="Utente guest" userId="S::urn:spo:anon#a2348d943f0b7a4d411fa761fd1ae9a36ef729135e117ae163cbf94b0bb3eff5::" providerId="AD" clId="Web-{47F70BF6-63C4-E085-4D92-61D5A5C06515}" dt="2023-07-24T22:06:40.831" v="85" actId="1076"/>
+          <ac:picMkLst>
+            <pc:docMk/>
+            <pc:sldMk cId="1947503260" sldId="357"/>
+            <ac:picMk id="3" creationId="{06CA8741-6C59-1A85-650B-F19C2426DE36}"/>
+          </ac:picMkLst>
+        </pc:picChg>
+        <pc:picChg chg="add del mod">
+          <ac:chgData name="Utente guest" userId="S::urn:spo:anon#a2348d943f0b7a4d411fa761fd1ae9a36ef729135e117ae163cbf94b0bb3eff5::" providerId="AD" clId="Web-{47F70BF6-63C4-E085-4D92-61D5A5C06515}" dt="2023-07-24T21:59:58.664" v="53"/>
+          <ac:picMkLst>
+            <pc:docMk/>
+            <pc:sldMk cId="1947503260" sldId="357"/>
+            <ac:picMk id="5" creationId="{C178AA86-75A6-487F-060F-D4151436949B}"/>
+          </ac:picMkLst>
+        </pc:picChg>
+        <pc:picChg chg="add del mod">
+          <ac:chgData name="Utente guest" userId="S::urn:spo:anon#a2348d943f0b7a4d411fa761fd1ae9a36ef729135e117ae163cbf94b0bb3eff5::" providerId="AD" clId="Web-{47F70BF6-63C4-E085-4D92-61D5A5C06515}" dt="2023-07-24T21:59:55.382" v="52"/>
+          <ac:picMkLst>
+            <pc:docMk/>
+            <pc:sldMk cId="1947503260" sldId="357"/>
+            <ac:picMk id="8" creationId="{A01F3FBA-6D6C-0700-6CD0-5FD5D0202086}"/>
+          </ac:picMkLst>
+        </pc:picChg>
+        <pc:picChg chg="add mod">
+          <ac:chgData name="Utente guest" userId="S::urn:spo:anon#a2348d943f0b7a4d411fa761fd1ae9a36ef729135e117ae163cbf94b0bb3eff5::" providerId="AD" clId="Web-{47F70BF6-63C4-E085-4D92-61D5A5C06515}" dt="2023-07-24T22:06:25.690" v="84" actId="1076"/>
+          <ac:picMkLst>
+            <pc:docMk/>
+            <pc:sldMk cId="1947503260" sldId="357"/>
+            <ac:picMk id="9" creationId="{C770C8EB-D7D9-1BB7-AAA8-9E607F546A59}"/>
+          </ac:picMkLst>
+        </pc:picChg>
+        <pc:picChg chg="add del mod">
+          <ac:chgData name="Utente guest" userId="S::urn:spo:anon#a2348d943f0b7a4d411fa761fd1ae9a36ef729135e117ae163cbf94b0bb3eff5::" providerId="AD" clId="Web-{47F70BF6-63C4-E085-4D92-61D5A5C06515}" dt="2023-07-24T22:00:04.898" v="55"/>
+          <ac:picMkLst>
+            <pc:docMk/>
+            <pc:sldMk cId="1947503260" sldId="357"/>
+            <ac:picMk id="10" creationId="{139D034E-3BD0-5654-4C00-D7B2721B5295}"/>
+          </ac:picMkLst>
+        </pc:picChg>
+        <pc:picChg chg="add del mod">
+          <ac:chgData name="Utente guest" userId="S::urn:spo:anon#a2348d943f0b7a4d411fa761fd1ae9a36ef729135e117ae163cbf94b0bb3eff5::" providerId="AD" clId="Web-{47F70BF6-63C4-E085-4D92-61D5A5C06515}" dt="2023-07-24T21:39:03.205" v="28"/>
+          <ac:picMkLst>
+            <pc:docMk/>
+            <pc:sldMk cId="1947503260" sldId="357"/>
+            <ac:picMk id="11" creationId="{7B6DA4C4-EAAE-4F47-5E46-FDD0B9A59348}"/>
+          </ac:picMkLst>
+        </pc:picChg>
+        <pc:picChg chg="add del mod">
+          <ac:chgData name="Utente guest" userId="S::urn:spo:anon#a2348d943f0b7a4d411fa761fd1ae9a36ef729135e117ae163cbf94b0bb3eff5::" providerId="AD" clId="Web-{47F70BF6-63C4-E085-4D92-61D5A5C06515}" dt="2023-07-24T22:00:07.133" v="56"/>
+          <ac:picMkLst>
+            <pc:docMk/>
+            <pc:sldMk cId="1947503260" sldId="357"/>
+            <ac:picMk id="12" creationId="{B748A1E1-09FD-C4A1-67EC-614D5D884F7D}"/>
+          </ac:picMkLst>
+        </pc:picChg>
+        <pc:picChg chg="add del mod ord">
+          <ac:chgData name="Utente guest" userId="S::urn:spo:anon#a2348d943f0b7a4d411fa761fd1ae9a36ef729135e117ae163cbf94b0bb3eff5::" providerId="AD" clId="Web-{47F70BF6-63C4-E085-4D92-61D5A5C06515}" dt="2023-07-24T22:00:09.227" v="57"/>
+          <ac:picMkLst>
+            <pc:docMk/>
+            <pc:sldMk cId="1947503260" sldId="357"/>
+            <ac:picMk id="13" creationId="{6861AA4A-035B-9564-EFED-BEEAFB47AB9D}"/>
+          </ac:picMkLst>
+        </pc:picChg>
+        <pc:picChg chg="add mod">
+          <ac:chgData name="Utente guest" userId="S::urn:spo:anon#a2348d943f0b7a4d411fa761fd1ae9a36ef729135e117ae163cbf94b0bb3eff5::" providerId="AD" clId="Web-{47F70BF6-63C4-E085-4D92-61D5A5C06515}" dt="2023-07-24T22:05:27.110" v="79" actId="1076"/>
+          <ac:picMkLst>
+            <pc:docMk/>
+            <pc:sldMk cId="1947503260" sldId="357"/>
+            <ac:picMk id="14" creationId="{8B557438-3F5C-F426-64E4-83BB75BA8DD8}"/>
+          </ac:picMkLst>
+        </pc:picChg>
+        <pc:picChg chg="add mod">
+          <ac:chgData name="Utente guest" userId="S::urn:spo:anon#a2348d943f0b7a4d411fa761fd1ae9a36ef729135e117ae163cbf94b0bb3eff5::" providerId="AD" clId="Web-{47F70BF6-63C4-E085-4D92-61D5A5C06515}" dt="2023-07-24T22:05:31.376" v="80" actId="1076"/>
+          <ac:picMkLst>
+            <pc:docMk/>
+            <pc:sldMk cId="1947503260" sldId="357"/>
+            <ac:picMk id="15" creationId="{9585CBFC-B1F9-A685-F065-558D2E01CDF0}"/>
+          </ac:picMkLst>
+        </pc:picChg>
+      </pc:sldChg>
+      <pc:sldChg chg="addSp delSp modSp">
+        <pc:chgData name="Utente guest" userId="S::urn:spo:anon#a2348d943f0b7a4d411fa761fd1ae9a36ef729135e117ae163cbf94b0bb3eff5::" providerId="AD" clId="Web-{47F70BF6-63C4-E085-4D92-61D5A5C06515}" dt="2023-07-24T23:22:38.363" v="90"/>
+        <pc:sldMkLst>
+          <pc:docMk/>
+          <pc:sldMk cId="2613890244" sldId="359"/>
+        </pc:sldMkLst>
+        <pc:picChg chg="add del mod">
+          <ac:chgData name="Utente guest" userId="S::urn:spo:anon#a2348d943f0b7a4d411fa761fd1ae9a36ef729135e117ae163cbf94b0bb3eff5::" providerId="AD" clId="Web-{47F70BF6-63C4-E085-4D92-61D5A5C06515}" dt="2023-07-24T23:22:38.363" v="90"/>
+          <ac:picMkLst>
+            <pc:docMk/>
+            <pc:sldMk cId="2613890244" sldId="359"/>
+            <ac:picMk id="2" creationId="{8A909CF2-AE6B-1FD6-CC1F-BD2F4AD19024}"/>
+          </ac:picMkLst>
+        </pc:picChg>
+      </pc:sldChg>
+      <pc:sldChg chg="add del replId">
+        <pc:chgData name="Utente guest" userId="S::urn:spo:anon#a2348d943f0b7a4d411fa761fd1ae9a36ef729135e117ae163cbf94b0bb3eff5::" providerId="AD" clId="Web-{47F70BF6-63C4-E085-4D92-61D5A5C06515}" dt="2023-07-24T22:49:37.900" v="87"/>
+        <pc:sldMkLst>
+          <pc:docMk/>
+          <pc:sldMk cId="4247892535" sldId="361"/>
+        </pc:sldMkLst>
+      </pc:sldChg>
+    </pc:docChg>
+  </pc:docChgLst>
+  <pc:docChgLst>
+    <pc:chgData name="SAMUELE TOSCANI" userId="S::271968@unimore.it::a8089736-90d3-4dcc-aef3-2d722c699ad9" providerId="AD" clId="Web-{9831B805-2E5F-38A7-0180-1EBE13289576}"/>
+    <pc:docChg chg="modSld">
+      <pc:chgData name="SAMUELE TOSCANI" userId="S::271968@unimore.it::a8089736-90d3-4dcc-aef3-2d722c699ad9" providerId="AD" clId="Web-{9831B805-2E5F-38A7-0180-1EBE13289576}" dt="2023-07-24T02:36:56.792" v="12"/>
+      <pc:docMkLst>
+        <pc:docMk/>
+      </pc:docMkLst>
+      <pc:sldChg chg="addSp delSp modSp">
+        <pc:chgData name="SAMUELE TOSCANI" userId="S::271968@unimore.it::a8089736-90d3-4dcc-aef3-2d722c699ad9" providerId="AD" clId="Web-{9831B805-2E5F-38A7-0180-1EBE13289576}" dt="2023-07-24T02:36:56.792" v="12"/>
+        <pc:sldMkLst>
+          <pc:docMk/>
+          <pc:sldMk cId="228484796" sldId="305"/>
+        </pc:sldMkLst>
+        <pc:spChg chg="del">
+          <ac:chgData name="SAMUELE TOSCANI" userId="S::271968@unimore.it::a8089736-90d3-4dcc-aef3-2d722c699ad9" providerId="AD" clId="Web-{9831B805-2E5F-38A7-0180-1EBE13289576}" dt="2023-07-24T02:36:51.135" v="9"/>
+          <ac:spMkLst>
+            <pc:docMk/>
+            <pc:sldMk cId="228484796" sldId="305"/>
+            <ac:spMk id="14" creationId="{DFBB32FA-51DD-4FB5-26F4-9D2B5D3C27DA}"/>
+          </ac:spMkLst>
+        </pc:spChg>
+        <pc:spChg chg="del">
+          <ac:chgData name="SAMUELE TOSCANI" userId="S::271968@unimore.it::a8089736-90d3-4dcc-aef3-2d722c699ad9" providerId="AD" clId="Web-{9831B805-2E5F-38A7-0180-1EBE13289576}" dt="2023-07-24T02:36:51.135" v="8"/>
+          <ac:spMkLst>
+            <pc:docMk/>
+            <pc:sldMk cId="228484796" sldId="305"/>
+            <ac:spMk id="17" creationId="{BFF0B727-689B-6E36-450F-1C8139DBBA93}"/>
+          </ac:spMkLst>
+        </pc:spChg>
+        <pc:picChg chg="add del mod">
+          <ac:chgData name="SAMUELE TOSCANI" userId="S::271968@unimore.it::a8089736-90d3-4dcc-aef3-2d722c699ad9" providerId="AD" clId="Web-{9831B805-2E5F-38A7-0180-1EBE13289576}" dt="2023-07-24T02:36:51.135" v="6"/>
+          <ac:picMkLst>
+            <pc:docMk/>
+            <pc:sldMk cId="228484796" sldId="305"/>
+            <ac:picMk id="2" creationId="{35A1D235-BA3B-DE38-630F-5CC751CC6E91}"/>
+          </ac:picMkLst>
+        </pc:picChg>
+        <pc:picChg chg="add del mod">
+          <ac:chgData name="SAMUELE TOSCANI" userId="S::271968@unimore.it::a8089736-90d3-4dcc-aef3-2d722c699ad9" providerId="AD" clId="Web-{9831B805-2E5F-38A7-0180-1EBE13289576}" dt="2023-07-24T02:36:56.792" v="12"/>
+          <ac:picMkLst>
+            <pc:docMk/>
+            <pc:sldMk cId="228484796" sldId="305"/>
+            <ac:picMk id="3" creationId="{C9AAB160-7362-4696-ED1A-BE4B4AEA090F}"/>
+          </ac:picMkLst>
+        </pc:picChg>
+        <pc:picChg chg="del mod">
+          <ac:chgData name="SAMUELE TOSCANI" userId="S::271968@unimore.it::a8089736-90d3-4dcc-aef3-2d722c699ad9" providerId="AD" clId="Web-{9831B805-2E5F-38A7-0180-1EBE13289576}" dt="2023-07-24T02:36:51.135" v="7"/>
+          <ac:picMkLst>
+            <pc:docMk/>
+            <pc:sldMk cId="228484796" sldId="305"/>
+            <ac:picMk id="19" creationId="{3EEB4665-F49B-6047-8C01-C066C7835912}"/>
+          </ac:picMkLst>
+        </pc:picChg>
+        <pc:cxnChg chg="del">
+          <ac:chgData name="SAMUELE TOSCANI" userId="S::271968@unimore.it::a8089736-90d3-4dcc-aef3-2d722c699ad9" providerId="AD" clId="Web-{9831B805-2E5F-38A7-0180-1EBE13289576}" dt="2023-07-24T02:36:51.135" v="10"/>
+          <ac:cxnSpMkLst>
+            <pc:docMk/>
+            <pc:sldMk cId="228484796" sldId="305"/>
+            <ac:cxnSpMk id="4" creationId="{2922600D-5549-E4EE-46BA-862BF80EE9EF}"/>
+          </ac:cxnSpMkLst>
+        </pc:cxnChg>
+      </pc:sldChg>
+    </pc:docChg>
+  </pc:docChgLst>
+  <pc:docChgLst>
     <pc:chgData name="Utente guest" userId="S::urn:spo:anon#a2348d943f0b7a4d411fa761fd1ae9a36ef729135e117ae163cbf94b0bb3eff5::" providerId="AD" clId="Web-{11AEDB27-700F-3F86-3204-E54027090BCB}"/>
     <pc:docChg chg="addSld modSld">
       <pc:chgData name="Utente guest" userId="S::urn:spo:anon#a2348d943f0b7a4d411fa761fd1ae9a36ef729135e117ae163cbf94b0bb3eff5::" providerId="AD" clId="Web-{11AEDB27-700F-3F86-3204-E54027090BCB}" dt="2023-07-25T03:38:31.242" v="604"/>
@@ -1447,211 +1652,6 @@
         <pc:sldMkLst>
           <pc:docMk/>
           <pc:sldMk cId="2987101719" sldId="361"/>
-        </pc:sldMkLst>
-      </pc:sldChg>
-    </pc:docChg>
-  </pc:docChgLst>
-  <pc:docChgLst>
-    <pc:chgData name="SAMUELE TOSCANI" userId="S::271968@unimore.it::a8089736-90d3-4dcc-aef3-2d722c699ad9" providerId="AD" clId="Web-{9831B805-2E5F-38A7-0180-1EBE13289576}"/>
-    <pc:docChg chg="modSld">
-      <pc:chgData name="SAMUELE TOSCANI" userId="S::271968@unimore.it::a8089736-90d3-4dcc-aef3-2d722c699ad9" providerId="AD" clId="Web-{9831B805-2E5F-38A7-0180-1EBE13289576}" dt="2023-07-24T02:36:56.792" v="12"/>
-      <pc:docMkLst>
-        <pc:docMk/>
-      </pc:docMkLst>
-      <pc:sldChg chg="addSp delSp modSp">
-        <pc:chgData name="SAMUELE TOSCANI" userId="S::271968@unimore.it::a8089736-90d3-4dcc-aef3-2d722c699ad9" providerId="AD" clId="Web-{9831B805-2E5F-38A7-0180-1EBE13289576}" dt="2023-07-24T02:36:56.792" v="12"/>
-        <pc:sldMkLst>
-          <pc:docMk/>
-          <pc:sldMk cId="228484796" sldId="305"/>
-        </pc:sldMkLst>
-        <pc:spChg chg="del">
-          <ac:chgData name="SAMUELE TOSCANI" userId="S::271968@unimore.it::a8089736-90d3-4dcc-aef3-2d722c699ad9" providerId="AD" clId="Web-{9831B805-2E5F-38A7-0180-1EBE13289576}" dt="2023-07-24T02:36:51.135" v="9"/>
-          <ac:spMkLst>
-            <pc:docMk/>
-            <pc:sldMk cId="228484796" sldId="305"/>
-            <ac:spMk id="14" creationId="{DFBB32FA-51DD-4FB5-26F4-9D2B5D3C27DA}"/>
-          </ac:spMkLst>
-        </pc:spChg>
-        <pc:spChg chg="del">
-          <ac:chgData name="SAMUELE TOSCANI" userId="S::271968@unimore.it::a8089736-90d3-4dcc-aef3-2d722c699ad9" providerId="AD" clId="Web-{9831B805-2E5F-38A7-0180-1EBE13289576}" dt="2023-07-24T02:36:51.135" v="8"/>
-          <ac:spMkLst>
-            <pc:docMk/>
-            <pc:sldMk cId="228484796" sldId="305"/>
-            <ac:spMk id="17" creationId="{BFF0B727-689B-6E36-450F-1C8139DBBA93}"/>
-          </ac:spMkLst>
-        </pc:spChg>
-        <pc:picChg chg="add del mod">
-          <ac:chgData name="SAMUELE TOSCANI" userId="S::271968@unimore.it::a8089736-90d3-4dcc-aef3-2d722c699ad9" providerId="AD" clId="Web-{9831B805-2E5F-38A7-0180-1EBE13289576}" dt="2023-07-24T02:36:51.135" v="6"/>
-          <ac:picMkLst>
-            <pc:docMk/>
-            <pc:sldMk cId="228484796" sldId="305"/>
-            <ac:picMk id="2" creationId="{35A1D235-BA3B-DE38-630F-5CC751CC6E91}"/>
-          </ac:picMkLst>
-        </pc:picChg>
-        <pc:picChg chg="add del mod">
-          <ac:chgData name="SAMUELE TOSCANI" userId="S::271968@unimore.it::a8089736-90d3-4dcc-aef3-2d722c699ad9" providerId="AD" clId="Web-{9831B805-2E5F-38A7-0180-1EBE13289576}" dt="2023-07-24T02:36:56.792" v="12"/>
-          <ac:picMkLst>
-            <pc:docMk/>
-            <pc:sldMk cId="228484796" sldId="305"/>
-            <ac:picMk id="3" creationId="{C9AAB160-7362-4696-ED1A-BE4B4AEA090F}"/>
-          </ac:picMkLst>
-        </pc:picChg>
-        <pc:picChg chg="del mod">
-          <ac:chgData name="SAMUELE TOSCANI" userId="S::271968@unimore.it::a8089736-90d3-4dcc-aef3-2d722c699ad9" providerId="AD" clId="Web-{9831B805-2E5F-38A7-0180-1EBE13289576}" dt="2023-07-24T02:36:51.135" v="7"/>
-          <ac:picMkLst>
-            <pc:docMk/>
-            <pc:sldMk cId="228484796" sldId="305"/>
-            <ac:picMk id="19" creationId="{3EEB4665-F49B-6047-8C01-C066C7835912}"/>
-          </ac:picMkLst>
-        </pc:picChg>
-        <pc:cxnChg chg="del">
-          <ac:chgData name="SAMUELE TOSCANI" userId="S::271968@unimore.it::a8089736-90d3-4dcc-aef3-2d722c699ad9" providerId="AD" clId="Web-{9831B805-2E5F-38A7-0180-1EBE13289576}" dt="2023-07-24T02:36:51.135" v="10"/>
-          <ac:cxnSpMkLst>
-            <pc:docMk/>
-            <pc:sldMk cId="228484796" sldId="305"/>
-            <ac:cxnSpMk id="4" creationId="{2922600D-5549-E4EE-46BA-862BF80EE9EF}"/>
-          </ac:cxnSpMkLst>
-        </pc:cxnChg>
-      </pc:sldChg>
-    </pc:docChg>
-  </pc:docChgLst>
-  <pc:docChgLst>
-    <pc:chgData name="Utente guest" userId="S::urn:spo:anon#a2348d943f0b7a4d411fa761fd1ae9a36ef729135e117ae163cbf94b0bb3eff5::" providerId="AD" clId="Web-{47F70BF6-63C4-E085-4D92-61D5A5C06515}"/>
-    <pc:docChg chg="addSld delSld modSld">
-      <pc:chgData name="Utente guest" userId="S::urn:spo:anon#a2348d943f0b7a4d411fa761fd1ae9a36ef729135e117ae163cbf94b0bb3eff5::" providerId="AD" clId="Web-{47F70BF6-63C4-E085-4D92-61D5A5C06515}" dt="2023-07-24T23:22:47.566" v="92" actId="1076"/>
-      <pc:docMkLst>
-        <pc:docMk/>
-      </pc:docMkLst>
-      <pc:sldChg chg="addSp modSp">
-        <pc:chgData name="Utente guest" userId="S::urn:spo:anon#a2348d943f0b7a4d411fa761fd1ae9a36ef729135e117ae163cbf94b0bb3eff5::" providerId="AD" clId="Web-{47F70BF6-63C4-E085-4D92-61D5A5C06515}" dt="2023-07-24T23:22:47.566" v="92" actId="1076"/>
-        <pc:sldMkLst>
-          <pc:docMk/>
-          <pc:sldMk cId="3796201048" sldId="312"/>
-        </pc:sldMkLst>
-        <pc:picChg chg="add mod">
-          <ac:chgData name="Utente guest" userId="S::urn:spo:anon#a2348d943f0b7a4d411fa761fd1ae9a36ef729135e117ae163cbf94b0bb3eff5::" providerId="AD" clId="Web-{47F70BF6-63C4-E085-4D92-61D5A5C06515}" dt="2023-07-24T23:22:47.566" v="92" actId="1076"/>
-          <ac:picMkLst>
-            <pc:docMk/>
-            <pc:sldMk cId="3796201048" sldId="312"/>
-            <ac:picMk id="2" creationId="{B08C89C6-8626-4113-4280-0F34705EC2D2}"/>
-          </ac:picMkLst>
-        </pc:picChg>
-      </pc:sldChg>
-      <pc:sldChg chg="addSp delSp modSp">
-        <pc:chgData name="Utente guest" userId="S::urn:spo:anon#a2348d943f0b7a4d411fa761fd1ae9a36ef729135e117ae163cbf94b0bb3eff5::" providerId="AD" clId="Web-{47F70BF6-63C4-E085-4D92-61D5A5C06515}" dt="2023-07-24T22:06:40.831" v="85" actId="1076"/>
-        <pc:sldMkLst>
-          <pc:docMk/>
-          <pc:sldMk cId="1947503260" sldId="357"/>
-        </pc:sldMkLst>
-        <pc:picChg chg="add del mod">
-          <ac:chgData name="Utente guest" userId="S::urn:spo:anon#a2348d943f0b7a4d411fa761fd1ae9a36ef729135e117ae163cbf94b0bb3eff5::" providerId="AD" clId="Web-{47F70BF6-63C4-E085-4D92-61D5A5C06515}" dt="2023-07-24T21:37:44.781" v="13"/>
-          <ac:picMkLst>
-            <pc:docMk/>
-            <pc:sldMk cId="1947503260" sldId="357"/>
-            <ac:picMk id="2" creationId="{10A2A9D6-E539-4451-7829-3CBDF379483D}"/>
-          </ac:picMkLst>
-        </pc:picChg>
-        <pc:picChg chg="add mod">
-          <ac:chgData name="Utente guest" userId="S::urn:spo:anon#a2348d943f0b7a4d411fa761fd1ae9a36ef729135e117ae163cbf94b0bb3eff5::" providerId="AD" clId="Web-{47F70BF6-63C4-E085-4D92-61D5A5C06515}" dt="2023-07-24T22:06:40.831" v="85" actId="1076"/>
-          <ac:picMkLst>
-            <pc:docMk/>
-            <pc:sldMk cId="1947503260" sldId="357"/>
-            <ac:picMk id="3" creationId="{06CA8741-6C59-1A85-650B-F19C2426DE36}"/>
-          </ac:picMkLst>
-        </pc:picChg>
-        <pc:picChg chg="add del mod">
-          <ac:chgData name="Utente guest" userId="S::urn:spo:anon#a2348d943f0b7a4d411fa761fd1ae9a36ef729135e117ae163cbf94b0bb3eff5::" providerId="AD" clId="Web-{47F70BF6-63C4-E085-4D92-61D5A5C06515}" dt="2023-07-24T21:59:58.664" v="53"/>
-          <ac:picMkLst>
-            <pc:docMk/>
-            <pc:sldMk cId="1947503260" sldId="357"/>
-            <ac:picMk id="5" creationId="{C178AA86-75A6-487F-060F-D4151436949B}"/>
-          </ac:picMkLst>
-        </pc:picChg>
-        <pc:picChg chg="add del mod">
-          <ac:chgData name="Utente guest" userId="S::urn:spo:anon#a2348d943f0b7a4d411fa761fd1ae9a36ef729135e117ae163cbf94b0bb3eff5::" providerId="AD" clId="Web-{47F70BF6-63C4-E085-4D92-61D5A5C06515}" dt="2023-07-24T21:59:55.382" v="52"/>
-          <ac:picMkLst>
-            <pc:docMk/>
-            <pc:sldMk cId="1947503260" sldId="357"/>
-            <ac:picMk id="8" creationId="{A01F3FBA-6D6C-0700-6CD0-5FD5D0202086}"/>
-          </ac:picMkLst>
-        </pc:picChg>
-        <pc:picChg chg="add mod">
-          <ac:chgData name="Utente guest" userId="S::urn:spo:anon#a2348d943f0b7a4d411fa761fd1ae9a36ef729135e117ae163cbf94b0bb3eff5::" providerId="AD" clId="Web-{47F70BF6-63C4-E085-4D92-61D5A5C06515}" dt="2023-07-24T22:06:25.690" v="84" actId="1076"/>
-          <ac:picMkLst>
-            <pc:docMk/>
-            <pc:sldMk cId="1947503260" sldId="357"/>
-            <ac:picMk id="9" creationId="{C770C8EB-D7D9-1BB7-AAA8-9E607F546A59}"/>
-          </ac:picMkLst>
-        </pc:picChg>
-        <pc:picChg chg="add del mod">
-          <ac:chgData name="Utente guest" userId="S::urn:spo:anon#a2348d943f0b7a4d411fa761fd1ae9a36ef729135e117ae163cbf94b0bb3eff5::" providerId="AD" clId="Web-{47F70BF6-63C4-E085-4D92-61D5A5C06515}" dt="2023-07-24T22:00:04.898" v="55"/>
-          <ac:picMkLst>
-            <pc:docMk/>
-            <pc:sldMk cId="1947503260" sldId="357"/>
-            <ac:picMk id="10" creationId="{139D034E-3BD0-5654-4C00-D7B2721B5295}"/>
-          </ac:picMkLst>
-        </pc:picChg>
-        <pc:picChg chg="add del mod">
-          <ac:chgData name="Utente guest" userId="S::urn:spo:anon#a2348d943f0b7a4d411fa761fd1ae9a36ef729135e117ae163cbf94b0bb3eff5::" providerId="AD" clId="Web-{47F70BF6-63C4-E085-4D92-61D5A5C06515}" dt="2023-07-24T21:39:03.205" v="28"/>
-          <ac:picMkLst>
-            <pc:docMk/>
-            <pc:sldMk cId="1947503260" sldId="357"/>
-            <ac:picMk id="11" creationId="{7B6DA4C4-EAAE-4F47-5E46-FDD0B9A59348}"/>
-          </ac:picMkLst>
-        </pc:picChg>
-        <pc:picChg chg="add del mod">
-          <ac:chgData name="Utente guest" userId="S::urn:spo:anon#a2348d943f0b7a4d411fa761fd1ae9a36ef729135e117ae163cbf94b0bb3eff5::" providerId="AD" clId="Web-{47F70BF6-63C4-E085-4D92-61D5A5C06515}" dt="2023-07-24T22:00:07.133" v="56"/>
-          <ac:picMkLst>
-            <pc:docMk/>
-            <pc:sldMk cId="1947503260" sldId="357"/>
-            <ac:picMk id="12" creationId="{B748A1E1-09FD-C4A1-67EC-614D5D884F7D}"/>
-          </ac:picMkLst>
-        </pc:picChg>
-        <pc:picChg chg="add del mod ord">
-          <ac:chgData name="Utente guest" userId="S::urn:spo:anon#a2348d943f0b7a4d411fa761fd1ae9a36ef729135e117ae163cbf94b0bb3eff5::" providerId="AD" clId="Web-{47F70BF6-63C4-E085-4D92-61D5A5C06515}" dt="2023-07-24T22:00:09.227" v="57"/>
-          <ac:picMkLst>
-            <pc:docMk/>
-            <pc:sldMk cId="1947503260" sldId="357"/>
-            <ac:picMk id="13" creationId="{6861AA4A-035B-9564-EFED-BEEAFB47AB9D}"/>
-          </ac:picMkLst>
-        </pc:picChg>
-        <pc:picChg chg="add mod">
-          <ac:chgData name="Utente guest" userId="S::urn:spo:anon#a2348d943f0b7a4d411fa761fd1ae9a36ef729135e117ae163cbf94b0bb3eff5::" providerId="AD" clId="Web-{47F70BF6-63C4-E085-4D92-61D5A5C06515}" dt="2023-07-24T22:05:27.110" v="79" actId="1076"/>
-          <ac:picMkLst>
-            <pc:docMk/>
-            <pc:sldMk cId="1947503260" sldId="357"/>
-            <ac:picMk id="14" creationId="{8B557438-3F5C-F426-64E4-83BB75BA8DD8}"/>
-          </ac:picMkLst>
-        </pc:picChg>
-        <pc:picChg chg="add mod">
-          <ac:chgData name="Utente guest" userId="S::urn:spo:anon#a2348d943f0b7a4d411fa761fd1ae9a36ef729135e117ae163cbf94b0bb3eff5::" providerId="AD" clId="Web-{47F70BF6-63C4-E085-4D92-61D5A5C06515}" dt="2023-07-24T22:05:31.376" v="80" actId="1076"/>
-          <ac:picMkLst>
-            <pc:docMk/>
-            <pc:sldMk cId="1947503260" sldId="357"/>
-            <ac:picMk id="15" creationId="{9585CBFC-B1F9-A685-F065-558D2E01CDF0}"/>
-          </ac:picMkLst>
-        </pc:picChg>
-      </pc:sldChg>
-      <pc:sldChg chg="addSp delSp modSp">
-        <pc:chgData name="Utente guest" userId="S::urn:spo:anon#a2348d943f0b7a4d411fa761fd1ae9a36ef729135e117ae163cbf94b0bb3eff5::" providerId="AD" clId="Web-{47F70BF6-63C4-E085-4D92-61D5A5C06515}" dt="2023-07-24T23:22:38.363" v="90"/>
-        <pc:sldMkLst>
-          <pc:docMk/>
-          <pc:sldMk cId="2613890244" sldId="359"/>
-        </pc:sldMkLst>
-        <pc:picChg chg="add del mod">
-          <ac:chgData name="Utente guest" userId="S::urn:spo:anon#a2348d943f0b7a4d411fa761fd1ae9a36ef729135e117ae163cbf94b0bb3eff5::" providerId="AD" clId="Web-{47F70BF6-63C4-E085-4D92-61D5A5C06515}" dt="2023-07-24T23:22:38.363" v="90"/>
-          <ac:picMkLst>
-            <pc:docMk/>
-            <pc:sldMk cId="2613890244" sldId="359"/>
-            <ac:picMk id="2" creationId="{8A909CF2-AE6B-1FD6-CC1F-BD2F4AD19024}"/>
-          </ac:picMkLst>
-        </pc:picChg>
-      </pc:sldChg>
-      <pc:sldChg chg="add del replId">
-        <pc:chgData name="Utente guest" userId="S::urn:spo:anon#a2348d943f0b7a4d411fa761fd1ae9a36ef729135e117ae163cbf94b0bb3eff5::" providerId="AD" clId="Web-{47F70BF6-63C4-E085-4D92-61D5A5C06515}" dt="2023-07-24T22:49:37.900" v="87"/>
-        <pc:sldMkLst>
-          <pc:docMk/>
-          <pc:sldMk cId="4247892535" sldId="361"/>
         </pc:sldMkLst>
       </pc:sldChg>
     </pc:docChg>
@@ -1844,7 +1844,7 @@
             <a:fld id="{692FA79D-8AE1-4621-820F-2A072225CBA5}" type="datetimeFigureOut">
               <a:rPr lang="it-IT" smtClean="0"/>
               <a:pPr/>
-              <a:t>21/11/2023</a:t>
+              <a:t>23/11/2023</a:t>
             </a:fld>
             <a:endParaRPr lang="it-IT"/>
           </a:p>
@@ -2995,7 +2995,7 @@
             <a:fld id="{C17488B4-7517-4113-80CD-8A5512E95C7C}" type="datetime1">
               <a:rPr lang="en-US" smtClean="0"/>
               <a:pPr/>
-              <a:t>11/21/2023</a:t>
+              <a:t>11/23/2023</a:t>
             </a:fld>
             <a:endParaRPr lang="it-IT"/>
           </a:p>
@@ -3421,7 +3421,7 @@
             <a:fld id="{DE8A4DC0-E433-490E-8191-9DA14A1EB354}" type="datetime1">
               <a:rPr lang="en-US" smtClean="0"/>
               <a:pPr/>
-              <a:t>11/21/2023</a:t>
+              <a:t>11/23/2023</a:t>
             </a:fld>
             <a:endParaRPr lang="en-US"/>
           </a:p>
@@ -3770,7 +3770,7 @@
             <a:fld id="{6300B4D0-16BD-4B37-B522-C51497F3B6AB}" type="datetime1">
               <a:rPr lang="en-US" smtClean="0"/>
               <a:pPr/>
-              <a:t>11/21/2023</a:t>
+              <a:t>11/23/2023</a:t>
             </a:fld>
             <a:endParaRPr lang="en-US"/>
           </a:p>
@@ -4188,7 +4188,7 @@
             <a:fld id="{986CDC88-23DA-4EB0-8691-4093BF5855BE}" type="datetime1">
               <a:rPr lang="en-US" smtClean="0"/>
               <a:pPr/>
-              <a:t>11/21/2023</a:t>
+              <a:t>11/23/2023</a:t>
             </a:fld>
             <a:endParaRPr lang="en-US"/>
           </a:p>
@@ -4769,7 +4769,7 @@
             <a:fld id="{CB6641D2-05E2-4B76-A8A8-D89540A3A497}" type="datetime1">
               <a:rPr lang="en-US" smtClean="0"/>
               <a:pPr/>
-              <a:t>11/21/2023</a:t>
+              <a:t>11/23/2023</a:t>
             </a:fld>
             <a:endParaRPr lang="en-US"/>
           </a:p>
@@ -5463,7 +5463,7 @@
             <a:fld id="{9D567C81-EAFA-49E4-B495-F9C4661D4231}" type="datetime1">
               <a:rPr lang="en-US" smtClean="0"/>
               <a:pPr/>
-              <a:t>11/21/2023</a:t>
+              <a:t>11/23/2023</a:t>
             </a:fld>
             <a:endParaRPr lang="en-US"/>
           </a:p>
@@ -6386,7 +6386,7 @@
             <a:fld id="{B0A16D91-8954-47D4-9804-4A30F2E2D7F3}" type="datetime1">
               <a:rPr lang="en-US" smtClean="0"/>
               <a:pPr/>
-              <a:t>11/21/2023</a:t>
+              <a:t>11/23/2023</a:t>
             </a:fld>
             <a:endParaRPr lang="en-US"/>
           </a:p>
@@ -6711,7 +6711,7 @@
             <a:fld id="{5BB211D2-24E7-402D-9855-ADF8C8CDD91F}" type="datetime1">
               <a:rPr lang="en-US" smtClean="0"/>
               <a:pPr/>
-              <a:t>11/21/2023</a:t>
+              <a:t>11/23/2023</a:t>
             </a:fld>
             <a:endParaRPr lang="en-US"/>
           </a:p>
@@ -6987,7 +6987,7 @@
             <a:fld id="{49100392-828A-48F3-B241-1A79A6BC472A}" type="datetime1">
               <a:rPr lang="en-US" smtClean="0"/>
               <a:pPr/>
-              <a:t>11/21/2023</a:t>
+              <a:t>11/23/2023</a:t>
             </a:fld>
             <a:endParaRPr lang="en-US"/>
           </a:p>
@@ -7693,7 +7693,7 @@
             <a:fld id="{E673BB17-ADFC-4681-B4C9-64FABA1B51A0}" type="datetime1">
               <a:rPr lang="en-US" smtClean="0"/>
               <a:pPr/>
-              <a:t>11/21/2023</a:t>
+              <a:t>11/23/2023</a:t>
             </a:fld>
             <a:endParaRPr lang="en-US"/>
           </a:p>
@@ -8095,7 +8095,7 @@
             <a:fld id="{D8371657-17F9-4B89-922A-65ED1D766FEF}" type="datetime1">
               <a:rPr lang="en-US" smtClean="0"/>
               <a:pPr/>
-              <a:t>11/21/2023</a:t>
+              <a:t>11/23/2023</a:t>
             </a:fld>
             <a:endParaRPr lang="en-US"/>
           </a:p>
@@ -8482,7 +8482,7 @@
             <a:fld id="{330405BF-C05C-43D8-8514-E4E91BED49A4}" type="datetime1">
               <a:rPr lang="en-US" smtClean="0"/>
               <a:pPr/>
-              <a:t>11/21/2023</a:t>
+              <a:t>11/23/2023</a:t>
             </a:fld>
             <a:endParaRPr lang="en-US"/>
           </a:p>
@@ -8999,7 +8999,7 @@
             <a:fld id="{EE61E00E-A87D-43B9-8E78-E2CDC1C32C86}" type="datetime1">
               <a:rPr lang="en-US" smtClean="0"/>
               <a:pPr/>
-              <a:t>11/21/2023</a:t>
+              <a:t>11/23/2023</a:t>
             </a:fld>
             <a:endParaRPr lang="en-US"/>
           </a:p>
@@ -9269,7 +9269,7 @@
             <a:fld id="{C7307FE3-AF4A-4398-B537-6DC35A0DF888}" type="datetime1">
               <a:rPr lang="en-US" smtClean="0"/>
               <a:pPr/>
-              <a:t>11/21/2023</a:t>
+              <a:t>11/23/2023</a:t>
             </a:fld>
             <a:endParaRPr lang="en-US"/>
           </a:p>
@@ -9446,7 +9446,7 @@
             <a:fld id="{8AEA320B-8A2B-4881-BDF9-8D50DCD75FEC}" type="datetime1">
               <a:rPr lang="en-US" smtClean="0"/>
               <a:pPr/>
-              <a:t>11/21/2023</a:t>
+              <a:t>11/23/2023</a:t>
             </a:fld>
             <a:endParaRPr lang="en-US"/>
           </a:p>
@@ -9848,7 +9848,7 @@
             <a:fld id="{AAEB8EA0-984F-43FA-94E5-15A4CB8A854A}" type="datetime1">
               <a:rPr lang="en-US" smtClean="0"/>
               <a:pPr/>
-              <a:t>11/21/2023</a:t>
+              <a:t>11/23/2023</a:t>
             </a:fld>
             <a:endParaRPr lang="en-US"/>
           </a:p>
@@ -10269,7 +10269,7 @@
             <a:fld id="{3057A344-CC8B-4933-8ED2-509F9E9291A9}" type="datetime1">
               <a:rPr lang="en-US" smtClean="0"/>
               <a:pPr/>
-              <a:t>11/21/2023</a:t>
+              <a:t>11/23/2023</a:t>
             </a:fld>
             <a:endParaRPr lang="en-US"/>
           </a:p>
@@ -10525,7 +10525,7 @@
             <a:fld id="{26467575-4D2F-40F5-BA77-9CB27679772F}" type="datetime1">
               <a:rPr lang="en-US" smtClean="0"/>
               <a:pPr/>
-              <a:t>11/21/2023</a:t>
+              <a:t>11/23/2023</a:t>
             </a:fld>
             <a:endParaRPr lang="en-US"/>
           </a:p>

</xml_diff>